<commit_message>
Update class diagrams content
</commit_message>
<xml_diff>
--- a/diagrams/uml/enumerations/playerTurn.pptx
+++ b/diagrams/uml/enumerations/playerTurn.pptx
@@ -288,7 +288,7 @@
           <a:p>
             <a:fld id="{A0F86979-30DA-49EE-A740-32EBA6D2B7DE}" type="datetimeFigureOut">
               <a:rPr lang="en-SG" smtClean="0"/>
-              <a:t>2/6/2017</a:t>
+              <a:t>8/6/2017</a:t>
             </a:fld>
             <a:endParaRPr lang="en-SG"/>
           </a:p>
@@ -458,7 +458,7 @@
           <a:p>
             <a:fld id="{A0F86979-30DA-49EE-A740-32EBA6D2B7DE}" type="datetimeFigureOut">
               <a:rPr lang="en-SG" smtClean="0"/>
-              <a:t>2/6/2017</a:t>
+              <a:t>8/6/2017</a:t>
             </a:fld>
             <a:endParaRPr lang="en-SG"/>
           </a:p>
@@ -638,7 +638,7 @@
           <a:p>
             <a:fld id="{A0F86979-30DA-49EE-A740-32EBA6D2B7DE}" type="datetimeFigureOut">
               <a:rPr lang="en-SG" smtClean="0"/>
-              <a:t>2/6/2017</a:t>
+              <a:t>8/6/2017</a:t>
             </a:fld>
             <a:endParaRPr lang="en-SG"/>
           </a:p>
@@ -808,7 +808,7 @@
           <a:p>
             <a:fld id="{A0F86979-30DA-49EE-A740-32EBA6D2B7DE}" type="datetimeFigureOut">
               <a:rPr lang="en-SG" smtClean="0"/>
-              <a:t>2/6/2017</a:t>
+              <a:t>8/6/2017</a:t>
             </a:fld>
             <a:endParaRPr lang="en-SG"/>
           </a:p>
@@ -1054,7 +1054,7 @@
           <a:p>
             <a:fld id="{A0F86979-30DA-49EE-A740-32EBA6D2B7DE}" type="datetimeFigureOut">
               <a:rPr lang="en-SG" smtClean="0"/>
-              <a:t>2/6/2017</a:t>
+              <a:t>8/6/2017</a:t>
             </a:fld>
             <a:endParaRPr lang="en-SG"/>
           </a:p>
@@ -1342,7 +1342,7 @@
           <a:p>
             <a:fld id="{A0F86979-30DA-49EE-A740-32EBA6D2B7DE}" type="datetimeFigureOut">
               <a:rPr lang="en-SG" smtClean="0"/>
-              <a:t>2/6/2017</a:t>
+              <a:t>8/6/2017</a:t>
             </a:fld>
             <a:endParaRPr lang="en-SG"/>
           </a:p>
@@ -1764,7 +1764,7 @@
           <a:p>
             <a:fld id="{A0F86979-30DA-49EE-A740-32EBA6D2B7DE}" type="datetimeFigureOut">
               <a:rPr lang="en-SG" smtClean="0"/>
-              <a:t>2/6/2017</a:t>
+              <a:t>8/6/2017</a:t>
             </a:fld>
             <a:endParaRPr lang="en-SG"/>
           </a:p>
@@ -1882,7 +1882,7 @@
           <a:p>
             <a:fld id="{A0F86979-30DA-49EE-A740-32EBA6D2B7DE}" type="datetimeFigureOut">
               <a:rPr lang="en-SG" smtClean="0"/>
-              <a:t>2/6/2017</a:t>
+              <a:t>8/6/2017</a:t>
             </a:fld>
             <a:endParaRPr lang="en-SG"/>
           </a:p>
@@ -1977,7 +1977,7 @@
           <a:p>
             <a:fld id="{A0F86979-30DA-49EE-A740-32EBA6D2B7DE}" type="datetimeFigureOut">
               <a:rPr lang="en-SG" smtClean="0"/>
-              <a:t>2/6/2017</a:t>
+              <a:t>8/6/2017</a:t>
             </a:fld>
             <a:endParaRPr lang="en-SG"/>
           </a:p>
@@ -2254,7 +2254,7 @@
           <a:p>
             <a:fld id="{A0F86979-30DA-49EE-A740-32EBA6D2B7DE}" type="datetimeFigureOut">
               <a:rPr lang="en-SG" smtClean="0"/>
-              <a:t>2/6/2017</a:t>
+              <a:t>8/6/2017</a:t>
             </a:fld>
             <a:endParaRPr lang="en-SG"/>
           </a:p>
@@ -2507,7 +2507,7 @@
           <a:p>
             <a:fld id="{A0F86979-30DA-49EE-A740-32EBA6D2B7DE}" type="datetimeFigureOut">
               <a:rPr lang="en-SG" smtClean="0"/>
-              <a:t>2/6/2017</a:t>
+              <a:t>8/6/2017</a:t>
             </a:fld>
             <a:endParaRPr lang="en-SG"/>
           </a:p>
@@ -2720,7 +2720,7 @@
           <a:p>
             <a:fld id="{A0F86979-30DA-49EE-A740-32EBA6D2B7DE}" type="datetimeFigureOut">
               <a:rPr lang="en-SG" smtClean="0"/>
-              <a:t>2/6/2017</a:t>
+              <a:t>8/6/2017</a:t>
             </a:fld>
             <a:endParaRPr lang="en-SG"/>
           </a:p>
@@ -3097,110 +3097,13 @@
       </p:grpSpPr>
       <p:sp>
         <p:nvSpPr>
-          <p:cNvPr id="247" name="Snip Diagonal Corner Rectangle 246"/>
+          <p:cNvPr id="31" name="Rectangle 30"/>
           <p:cNvSpPr/>
           <p:nvPr/>
         </p:nvSpPr>
         <p:spPr>
           <a:xfrm>
-            <a:off x="4419600" y="1645508"/>
-            <a:ext cx="4495800" cy="3810000"/>
-          </a:xfrm>
-          <a:prstGeom prst="snip2DiagRect">
-            <a:avLst/>
-          </a:prstGeom>
-          <a:ln>
-            <a:solidFill>
-              <a:schemeClr val="tx2">
-                <a:lumMod val="40000"/>
-                <a:lumOff val="60000"/>
-              </a:schemeClr>
-            </a:solidFill>
-          </a:ln>
-        </p:spPr>
-        <p:style>
-          <a:lnRef idx="2">
-            <a:schemeClr val="accent5"/>
-          </a:lnRef>
-          <a:fillRef idx="1">
-            <a:schemeClr val="lt1"/>
-          </a:fillRef>
-          <a:effectRef idx="0">
-            <a:schemeClr val="accent5"/>
-          </a:effectRef>
-          <a:fontRef idx="minor">
-            <a:schemeClr val="dk1"/>
-          </a:fontRef>
-        </p:style>
-        <p:txBody>
-          <a:bodyPr rtlCol="0" anchor="ctr"/>
-          <a:lstStyle/>
-          <a:p>
-            <a:pPr algn="ctr"/>
-            <a:endParaRPr lang="en-US" dirty="0"/>
-          </a:p>
-        </p:txBody>
-      </p:sp>
-      <p:sp>
-        <p:nvSpPr>
-          <p:cNvPr id="248" name="Snip Diagonal Corner Rectangle 247"/>
-          <p:cNvSpPr/>
-          <p:nvPr/>
-        </p:nvSpPr>
-        <p:spPr>
-          <a:xfrm>
-            <a:off x="228600" y="1645508"/>
-            <a:ext cx="4038600" cy="3810000"/>
-          </a:xfrm>
-          <a:prstGeom prst="snip2DiagRect">
-            <a:avLst/>
-          </a:prstGeom>
-          <a:ln>
-            <a:solidFill>
-              <a:schemeClr val="tx2">
-                <a:lumMod val="40000"/>
-                <a:lumOff val="60000"/>
-              </a:schemeClr>
-            </a:solidFill>
-            <a:prstDash val="sysDash"/>
-          </a:ln>
-        </p:spPr>
-        <p:style>
-          <a:lnRef idx="2">
-            <a:schemeClr val="accent5"/>
-          </a:lnRef>
-          <a:fillRef idx="1">
-            <a:schemeClr val="lt1"/>
-          </a:fillRef>
-          <a:effectRef idx="0">
-            <a:schemeClr val="accent5"/>
-          </a:effectRef>
-          <a:fontRef idx="minor">
-            <a:schemeClr val="dk1"/>
-          </a:fontRef>
-        </p:style>
-        <p:txBody>
-          <a:bodyPr rtlCol="0" anchor="ctr"/>
-          <a:lstStyle/>
-          <a:p>
-            <a:pPr algn="ctr"/>
-            <a:endParaRPr lang="en-US" dirty="0">
-              <a:solidFill>
-                <a:schemeClr val="dk1"/>
-              </a:solidFill>
-            </a:endParaRPr>
-          </a:p>
-        </p:txBody>
-      </p:sp>
-      <p:sp>
-        <p:nvSpPr>
-          <p:cNvPr id="249" name="Rectangle 248"/>
-          <p:cNvSpPr/>
-          <p:nvPr/>
-        </p:nvSpPr>
-        <p:spPr>
-          <a:xfrm>
-            <a:off x="304800" y="1950308"/>
+            <a:off x="304800" y="4671535"/>
             <a:ext cx="1143000" cy="369332"/>
           </a:xfrm>
           <a:prstGeom prst="rect">
@@ -3281,896 +3184,13 @@
       </p:sp>
       <p:sp>
         <p:nvSpPr>
-          <p:cNvPr id="250" name="Rectangle 249"/>
+          <p:cNvPr id="32" name="Rectangle 31"/>
           <p:cNvSpPr/>
           <p:nvPr/>
         </p:nvSpPr>
         <p:spPr>
           <a:xfrm>
-            <a:off x="2438400" y="3137242"/>
-            <a:ext cx="1524000" cy="369332"/>
-          </a:xfrm>
-          <a:prstGeom prst="rect">
-            <a:avLst/>
-          </a:prstGeom>
-          <a:gradFill rotWithShape="1">
-            <a:gsLst>
-              <a:gs pos="0">
-                <a:srgbClr val="9BBB59">
-                  <a:tint val="50000"/>
-                  <a:satMod val="300000"/>
-                </a:srgbClr>
-              </a:gs>
-              <a:gs pos="35000">
-                <a:srgbClr val="9BBB59">
-                  <a:tint val="37000"/>
-                  <a:satMod val="300000"/>
-                </a:srgbClr>
-              </a:gs>
-              <a:gs pos="100000">
-                <a:srgbClr val="9BBB59">
-                  <a:tint val="15000"/>
-                  <a:satMod val="350000"/>
-                </a:srgbClr>
-              </a:gs>
-            </a:gsLst>
-            <a:lin ang="16200000" scaled="1"/>
-          </a:gradFill>
-          <a:ln w="9525" cap="flat" cmpd="sng" algn="ctr">
-            <a:solidFill>
-              <a:schemeClr val="tx1"/>
-            </a:solidFill>
-            <a:prstDash val="solid"/>
-          </a:ln>
-          <a:effectLst>
-            <a:outerShdw blurRad="40000" dist="20000" dir="5400000" rotWithShape="0">
-              <a:srgbClr val="000000">
-                <a:alpha val="38000"/>
-              </a:srgbClr>
-            </a:outerShdw>
-          </a:effectLst>
-        </p:spPr>
-        <p:txBody>
-          <a:bodyPr wrap="square" rtlCol="0" anchor="ctr">
-            <a:spAutoFit/>
-          </a:bodyPr>
-          <a:lstStyle/>
-          <a:p>
-            <a:pPr marL="0" marR="0" lvl="0" indent="0" algn="ctr" defTabSz="914400" eaLnBrk="1" fontAlgn="auto" latinLnBrk="0" hangingPunct="1">
-              <a:lnSpc>
-                <a:spcPct val="100000"/>
-              </a:lnSpc>
-              <a:spcBef>
-                <a:spcPts val="0"/>
-              </a:spcBef>
-              <a:spcAft>
-                <a:spcPts val="0"/>
-              </a:spcAft>
-              <a:buClrTx/>
-              <a:buSzTx/>
-              <a:buFontTx/>
-              <a:buNone/>
-              <a:tabLst/>
-              <a:defRPr/>
-            </a:pPr>
-            <a:r>
-              <a:rPr kumimoji="0" lang="en-US" sz="1800" b="0" i="0" u="none" strike="noStrike" kern="0" cap="none" spc="0" normalizeH="0" baseline="0" noProof="0" dirty="0" smtClean="0">
-                <a:ln>
-                  <a:noFill/>
-                </a:ln>
-                <a:solidFill>
-                  <a:sysClr val="windowText" lastClr="000000"/>
-                </a:solidFill>
-                <a:effectLst/>
-                <a:uLnTx/>
-                <a:uFillTx/>
-                <a:latin typeface="Calibri" pitchFamily="34" charset="0"/>
-              </a:rPr>
-              <a:t>Die</a:t>
-            </a:r>
-            <a:endParaRPr kumimoji="0" lang="en-US" sz="1800" b="0" i="0" u="none" strike="noStrike" kern="0" cap="none" spc="0" normalizeH="0" baseline="0" noProof="0" dirty="0">
-              <a:ln>
-                <a:noFill/>
-              </a:ln>
-              <a:solidFill>
-                <a:sysClr val="windowText" lastClr="000000"/>
-              </a:solidFill>
-              <a:effectLst/>
-              <a:uLnTx/>
-              <a:uFillTx/>
-              <a:latin typeface="Calibri" pitchFamily="34" charset="0"/>
-            </a:endParaRPr>
-          </a:p>
-        </p:txBody>
-      </p:sp>
-      <p:sp>
-        <p:nvSpPr>
-          <p:cNvPr id="251" name="Rectangle 250"/>
-          <p:cNvSpPr/>
-          <p:nvPr/>
-        </p:nvSpPr>
-        <p:spPr>
-          <a:xfrm>
-            <a:off x="2628900" y="1950308"/>
-            <a:ext cx="1143000" cy="369332"/>
-          </a:xfrm>
-          <a:prstGeom prst="rect">
-            <a:avLst/>
-          </a:prstGeom>
-          <a:solidFill>
-            <a:srgbClr val="8064A2">
-              <a:tint val="50000"/>
-              <a:satMod val="300000"/>
-            </a:srgbClr>
-          </a:solidFill>
-          <a:ln w="9525" cap="flat" cmpd="sng" algn="ctr">
-            <a:solidFill>
-              <a:schemeClr val="tx1"/>
-            </a:solidFill>
-            <a:prstDash val="solid"/>
-          </a:ln>
-          <a:effectLst>
-            <a:outerShdw blurRad="40000" dist="20000" dir="5400000" rotWithShape="0">
-              <a:srgbClr val="000000">
-                <a:alpha val="38000"/>
-              </a:srgbClr>
-            </a:outerShdw>
-          </a:effectLst>
-        </p:spPr>
-        <p:txBody>
-          <a:bodyPr wrap="square" rtlCol="0" anchor="ctr">
-            <a:spAutoFit/>
-          </a:bodyPr>
-          <a:lstStyle/>
-          <a:p>
-            <a:pPr marL="0" marR="0" lvl="0" indent="0" algn="ctr" defTabSz="914400" eaLnBrk="1" fontAlgn="auto" latinLnBrk="0" hangingPunct="1">
-              <a:lnSpc>
-                <a:spcPct val="100000"/>
-              </a:lnSpc>
-              <a:spcBef>
-                <a:spcPts val="0"/>
-              </a:spcBef>
-              <a:spcAft>
-                <a:spcPts val="0"/>
-              </a:spcAft>
-              <a:buClrTx/>
-              <a:buSzTx/>
-              <a:buFontTx/>
-              <a:buNone/>
-              <a:tabLst/>
-              <a:defRPr/>
-            </a:pPr>
-            <a:r>
-              <a:rPr kumimoji="0" lang="en-US" sz="1800" b="0" i="0" u="none" strike="noStrike" kern="0" cap="none" spc="0" normalizeH="0" baseline="0" noProof="0" dirty="0" smtClean="0">
-                <a:ln>
-                  <a:noFill/>
-                </a:ln>
-                <a:solidFill>
-                  <a:sysClr val="windowText" lastClr="000000"/>
-                </a:solidFill>
-                <a:effectLst/>
-                <a:uLnTx/>
-                <a:uFillTx/>
-                <a:latin typeface="Calibri" pitchFamily="34" charset="0"/>
-              </a:rPr>
-              <a:t>Turn</a:t>
-            </a:r>
-            <a:endParaRPr kumimoji="0" lang="en-US" sz="1800" b="0" i="0" u="none" strike="noStrike" kern="0" cap="none" spc="0" normalizeH="0" baseline="0" noProof="0" dirty="0">
-              <a:ln>
-                <a:noFill/>
-              </a:ln>
-              <a:solidFill>
-                <a:sysClr val="windowText" lastClr="000000"/>
-              </a:solidFill>
-              <a:effectLst/>
-              <a:uLnTx/>
-              <a:uFillTx/>
-              <a:latin typeface="Calibri" pitchFamily="34" charset="0"/>
-            </a:endParaRPr>
-          </a:p>
-        </p:txBody>
-      </p:sp>
-      <p:cxnSp>
-        <p:nvCxnSpPr>
-          <p:cNvPr id="252" name="Elbow Connector 251"/>
-          <p:cNvCxnSpPr>
-            <a:stCxn id="249" idx="3"/>
-            <a:endCxn id="251" idx="1"/>
-          </p:cNvCxnSpPr>
-          <p:nvPr/>
-        </p:nvCxnSpPr>
-        <p:spPr>
-          <a:xfrm>
-            <a:off x="1447800" y="2134974"/>
-            <a:ext cx="1181100" cy="1588"/>
-          </a:xfrm>
-          <a:prstGeom prst="bentConnector3">
-            <a:avLst>
-              <a:gd name="adj1" fmla="val 50000"/>
-            </a:avLst>
-          </a:prstGeom>
-          <a:noFill/>
-          <a:ln w="9525" cap="flat" cmpd="sng" algn="ctr">
-            <a:solidFill>
-              <a:sysClr val="windowText" lastClr="000000"/>
-            </a:solidFill>
-            <a:prstDash val="solid"/>
-          </a:ln>
-          <a:effectLst/>
-        </p:spPr>
-      </p:cxnSp>
-      <p:cxnSp>
-        <p:nvCxnSpPr>
-          <p:cNvPr id="253" name="Elbow Connector 252"/>
-          <p:cNvCxnSpPr>
-            <a:stCxn id="250" idx="0"/>
-            <a:endCxn id="251" idx="2"/>
-          </p:cNvCxnSpPr>
-          <p:nvPr/>
-        </p:nvCxnSpPr>
-        <p:spPr>
-          <a:xfrm rot="5400000" flipH="1" flipV="1">
-            <a:off x="2791599" y="2728441"/>
-            <a:ext cx="817602" cy="1588"/>
-          </a:xfrm>
-          <a:prstGeom prst="bentConnector3">
-            <a:avLst>
-              <a:gd name="adj1" fmla="val 50000"/>
-            </a:avLst>
-          </a:prstGeom>
-          <a:noFill/>
-          <a:ln w="9525" cap="flat" cmpd="sng" algn="ctr">
-            <a:solidFill>
-              <a:sysClr val="windowText" lastClr="000000"/>
-            </a:solidFill>
-            <a:prstDash val="solid"/>
-          </a:ln>
-          <a:effectLst/>
-        </p:spPr>
-      </p:cxnSp>
-      <p:sp>
-        <p:nvSpPr>
-          <p:cNvPr id="254" name="Rectangle 253"/>
-          <p:cNvSpPr/>
-          <p:nvPr/>
-        </p:nvSpPr>
-        <p:spPr>
-          <a:xfrm>
-            <a:off x="2438400" y="3462640"/>
-            <a:ext cx="1524000" cy="369332"/>
-          </a:xfrm>
-          <a:prstGeom prst="rect">
-            <a:avLst/>
-          </a:prstGeom>
-          <a:gradFill rotWithShape="1">
-            <a:gsLst>
-              <a:gs pos="0">
-                <a:srgbClr val="9BBB59">
-                  <a:tint val="50000"/>
-                  <a:satMod val="300000"/>
-                </a:srgbClr>
-              </a:gs>
-              <a:gs pos="35000">
-                <a:srgbClr val="9BBB59">
-                  <a:tint val="37000"/>
-                  <a:satMod val="300000"/>
-                </a:srgbClr>
-              </a:gs>
-              <a:gs pos="100000">
-                <a:srgbClr val="9BBB59">
-                  <a:tint val="15000"/>
-                  <a:satMod val="350000"/>
-                </a:srgbClr>
-              </a:gs>
-            </a:gsLst>
-            <a:lin ang="16200000" scaled="1"/>
-          </a:gradFill>
-          <a:ln w="9525" cap="flat" cmpd="sng" algn="ctr">
-            <a:solidFill>
-              <a:schemeClr val="tx1"/>
-            </a:solidFill>
-            <a:prstDash val="solid"/>
-          </a:ln>
-          <a:effectLst>
-            <a:outerShdw blurRad="40000" dist="20000" dir="5400000" rotWithShape="0">
-              <a:srgbClr val="000000">
-                <a:alpha val="38000"/>
-              </a:srgbClr>
-            </a:outerShdw>
-          </a:effectLst>
-        </p:spPr>
-        <p:txBody>
-          <a:bodyPr wrap="square" rtlCol="0" anchor="ctr">
-            <a:spAutoFit/>
-          </a:bodyPr>
-          <a:lstStyle/>
-          <a:p>
-            <a:pPr marL="0" marR="0" lvl="0" indent="0" algn="ctr" defTabSz="914400" eaLnBrk="1" fontAlgn="auto" latinLnBrk="0" hangingPunct="1">
-              <a:lnSpc>
-                <a:spcPct val="100000"/>
-              </a:lnSpc>
-              <a:spcBef>
-                <a:spcPts val="0"/>
-              </a:spcBef>
-              <a:spcAft>
-                <a:spcPts val="0"/>
-              </a:spcAft>
-              <a:buClrTx/>
-              <a:buSzTx/>
-              <a:buFontTx/>
-              <a:buNone/>
-              <a:tabLst/>
-              <a:defRPr/>
-            </a:pPr>
-            <a:r>
-              <a:rPr kumimoji="0" lang="en-US" sz="1800" b="0" i="0" u="none" strike="noStrike" kern="0" cap="none" spc="0" normalizeH="0" baseline="0" noProof="0" dirty="0" err="1" smtClean="0">
-                <a:ln>
-                  <a:noFill/>
-                </a:ln>
-                <a:solidFill>
-                  <a:sysClr val="windowText" lastClr="000000"/>
-                </a:solidFill>
-                <a:effectLst/>
-                <a:uLnTx/>
-                <a:uFillTx/>
-                <a:latin typeface="Calibri" pitchFamily="34" charset="0"/>
-              </a:rPr>
-              <a:t>FaceValue</a:t>
-            </a:r>
-            <a:r>
-              <a:rPr kumimoji="0" lang="en-US" sz="1800" b="0" i="0" u="none" strike="noStrike" kern="0" cap="none" spc="0" normalizeH="0" baseline="0" noProof="0" dirty="0" smtClean="0">
-                <a:ln>
-                  <a:noFill/>
-                </a:ln>
-                <a:solidFill>
-                  <a:sysClr val="windowText" lastClr="000000"/>
-                </a:solidFill>
-                <a:effectLst/>
-                <a:uLnTx/>
-                <a:uFillTx/>
-                <a:latin typeface="Calibri" pitchFamily="34" charset="0"/>
-              </a:rPr>
-              <a:t>: </a:t>
-            </a:r>
-            <a:r>
-              <a:rPr kumimoji="0" lang="en-US" sz="1800" b="1" i="0" u="none" strike="noStrike" kern="0" cap="none" spc="0" normalizeH="0" baseline="0" noProof="0" dirty="0" err="1" smtClean="0">
-                <a:ln>
-                  <a:noFill/>
-                </a:ln>
-                <a:solidFill>
-                  <a:sysClr val="windowText" lastClr="000000"/>
-                </a:solidFill>
-                <a:effectLst/>
-                <a:uLnTx/>
-                <a:uFillTx/>
-                <a:latin typeface="Calibri" pitchFamily="34" charset="0"/>
-              </a:rPr>
-              <a:t>int</a:t>
-            </a:r>
-            <a:endParaRPr kumimoji="0" lang="en-US" sz="1800" b="1" i="0" u="none" strike="noStrike" kern="0" cap="none" spc="0" normalizeH="0" baseline="0" noProof="0" dirty="0">
-              <a:ln>
-                <a:noFill/>
-              </a:ln>
-              <a:solidFill>
-                <a:sysClr val="windowText" lastClr="000000"/>
-              </a:solidFill>
-              <a:effectLst/>
-              <a:uLnTx/>
-              <a:uFillTx/>
-              <a:latin typeface="Calibri" pitchFamily="34" charset="0"/>
-            </a:endParaRPr>
-          </a:p>
-        </p:txBody>
-      </p:sp>
-      <p:cxnSp>
-        <p:nvCxnSpPr>
-          <p:cNvPr id="255" name="Elbow Connector 51"/>
-          <p:cNvCxnSpPr>
-            <a:stCxn id="249" idx="2"/>
-            <a:endCxn id="250" idx="1"/>
-          </p:cNvCxnSpPr>
-          <p:nvPr/>
-        </p:nvCxnSpPr>
-        <p:spPr>
-          <a:xfrm rot="16200000" flipH="1">
-            <a:off x="1156216" y="2039724"/>
-            <a:ext cx="1002268" cy="1562100"/>
-          </a:xfrm>
-          <a:prstGeom prst="bentConnector2">
-            <a:avLst/>
-          </a:prstGeom>
-          <a:noFill/>
-          <a:ln w="9525" cap="flat" cmpd="sng" algn="ctr">
-            <a:solidFill>
-              <a:sysClr val="windowText" lastClr="000000"/>
-            </a:solidFill>
-            <a:prstDash val="solid"/>
-          </a:ln>
-          <a:effectLst/>
-        </p:spPr>
-      </p:cxnSp>
-      <p:sp>
-        <p:nvSpPr>
-          <p:cNvPr id="256" name="TextBox 255"/>
-          <p:cNvSpPr txBox="1"/>
-          <p:nvPr/>
-        </p:nvSpPr>
-        <p:spPr>
-          <a:xfrm>
-            <a:off x="1524000" y="1786240"/>
-            <a:ext cx="914400" cy="369332"/>
-          </a:xfrm>
-          <a:prstGeom prst="rect">
-            <a:avLst/>
-          </a:prstGeom>
-          <a:noFill/>
-        </p:spPr>
-        <p:txBody>
-          <a:bodyPr wrap="square" rtlCol="0">
-            <a:spAutoFit/>
-          </a:bodyPr>
-          <a:lstStyle/>
-          <a:p>
-            <a:pPr marL="0" marR="0" lvl="0" indent="0" defTabSz="914400" eaLnBrk="1" fontAlgn="auto" latinLnBrk="0" hangingPunct="1">
-              <a:lnSpc>
-                <a:spcPct val="100000"/>
-              </a:lnSpc>
-              <a:spcBef>
-                <a:spcPts val="0"/>
-              </a:spcBef>
-              <a:spcAft>
-                <a:spcPts val="0"/>
-              </a:spcAft>
-              <a:buClrTx/>
-              <a:buSzTx/>
-              <a:buFontTx/>
-              <a:buNone/>
-              <a:tabLst/>
-              <a:defRPr/>
-            </a:pPr>
-            <a:r>
-              <a:rPr kumimoji="0" lang="en-US" sz="1800" b="0" i="0" u="none" strike="noStrike" kern="0" cap="none" spc="0" normalizeH="0" baseline="0" noProof="0" dirty="0" smtClean="0">
-                <a:ln>
-                  <a:noFill/>
-                </a:ln>
-                <a:solidFill>
-                  <a:sysClr val="windowText" lastClr="000000"/>
-                </a:solidFill>
-                <a:effectLst/>
-                <a:uLnTx/>
-                <a:uFillTx/>
-                <a:latin typeface="Calibri" pitchFamily="34" charset="0"/>
-              </a:rPr>
-              <a:t>takes</a:t>
-            </a:r>
-            <a:endParaRPr kumimoji="0" lang="en-US" sz="1800" b="1" i="0" u="none" strike="noStrike" kern="0" cap="none" spc="0" normalizeH="0" baseline="0" noProof="0" dirty="0">
-              <a:ln>
-                <a:noFill/>
-              </a:ln>
-              <a:solidFill>
-                <a:sysClr val="windowText" lastClr="000000"/>
-              </a:solidFill>
-              <a:effectLst/>
-              <a:uLnTx/>
-              <a:uFillTx/>
-              <a:latin typeface="Calibri" pitchFamily="34" charset="0"/>
-            </a:endParaRPr>
-          </a:p>
-        </p:txBody>
-      </p:sp>
-      <p:sp>
-        <p:nvSpPr>
-          <p:cNvPr id="257" name="TextBox 256"/>
-          <p:cNvSpPr txBox="1"/>
-          <p:nvPr/>
-        </p:nvSpPr>
-        <p:spPr>
-          <a:xfrm>
-            <a:off x="990600" y="2776840"/>
-            <a:ext cx="1066800" cy="369332"/>
-          </a:xfrm>
-          <a:prstGeom prst="rect">
-            <a:avLst/>
-          </a:prstGeom>
-          <a:noFill/>
-        </p:spPr>
-        <p:txBody>
-          <a:bodyPr wrap="square" rtlCol="0">
-            <a:spAutoFit/>
-          </a:bodyPr>
-          <a:lstStyle/>
-          <a:p>
-            <a:pPr marL="0" marR="0" lvl="0" indent="0" defTabSz="914400" eaLnBrk="1" fontAlgn="auto" latinLnBrk="0" hangingPunct="1">
-              <a:lnSpc>
-                <a:spcPct val="100000"/>
-              </a:lnSpc>
-              <a:spcBef>
-                <a:spcPts val="0"/>
-              </a:spcBef>
-              <a:spcAft>
-                <a:spcPts val="0"/>
-              </a:spcAft>
-              <a:buClrTx/>
-              <a:buSzTx/>
-              <a:buFontTx/>
-              <a:buNone/>
-              <a:tabLst/>
-              <a:defRPr/>
-            </a:pPr>
-            <a:r>
-              <a:rPr kumimoji="0" lang="en-US" sz="1800" b="0" i="0" u="none" strike="noStrike" kern="0" cap="none" spc="0" normalizeH="0" baseline="0" noProof="0" smtClean="0">
-                <a:ln>
-                  <a:noFill/>
-                </a:ln>
-                <a:solidFill>
-                  <a:sysClr val="windowText" lastClr="000000"/>
-                </a:solidFill>
-                <a:effectLst/>
-                <a:uLnTx/>
-                <a:uFillTx/>
-                <a:latin typeface="Calibri" pitchFamily="34" charset="0"/>
-              </a:rPr>
-              <a:t>throws</a:t>
-            </a:r>
-            <a:endParaRPr kumimoji="0" lang="en-US" sz="1800" b="1" i="0" u="none" strike="noStrike" kern="0" cap="none" spc="0" normalizeH="0" baseline="0" noProof="0" dirty="0">
-              <a:ln>
-                <a:noFill/>
-              </a:ln>
-              <a:solidFill>
-                <a:sysClr val="windowText" lastClr="000000"/>
-              </a:solidFill>
-              <a:effectLst/>
-              <a:uLnTx/>
-              <a:uFillTx/>
-              <a:latin typeface="Calibri" pitchFamily="34" charset="0"/>
-            </a:endParaRPr>
-          </a:p>
-        </p:txBody>
-      </p:sp>
-      <p:sp>
-        <p:nvSpPr>
-          <p:cNvPr id="258" name="TextBox 257"/>
-          <p:cNvSpPr txBox="1"/>
-          <p:nvPr/>
-        </p:nvSpPr>
-        <p:spPr>
-          <a:xfrm>
-            <a:off x="2743200" y="2700640"/>
-            <a:ext cx="381000" cy="381000"/>
-          </a:xfrm>
-          <a:prstGeom prst="rect">
-            <a:avLst/>
-          </a:prstGeom>
-          <a:noFill/>
-        </p:spPr>
-        <p:txBody>
-          <a:bodyPr wrap="square" rtlCol="0">
-            <a:spAutoFit/>
-          </a:bodyPr>
-          <a:lstStyle/>
-          <a:p>
-            <a:pPr marL="0" marR="0" lvl="0" indent="0" defTabSz="914400" eaLnBrk="1" fontAlgn="auto" latinLnBrk="0" hangingPunct="1">
-              <a:lnSpc>
-                <a:spcPct val="100000"/>
-              </a:lnSpc>
-              <a:spcBef>
-                <a:spcPts val="0"/>
-              </a:spcBef>
-              <a:spcAft>
-                <a:spcPts val="0"/>
-              </a:spcAft>
-              <a:buClrTx/>
-              <a:buSzTx/>
-              <a:buFontTx/>
-              <a:buNone/>
-              <a:tabLst/>
-              <a:defRPr/>
-            </a:pPr>
-            <a:r>
-              <a:rPr kumimoji="0" lang="en-US" sz="1800" b="0" i="0" u="none" strike="noStrike" kern="0" cap="none" spc="0" normalizeH="0" baseline="0" noProof="0" dirty="0" smtClean="0">
-                <a:ln>
-                  <a:noFill/>
-                </a:ln>
-                <a:solidFill>
-                  <a:sysClr val="windowText" lastClr="000000"/>
-                </a:solidFill>
-                <a:effectLst/>
-                <a:uLnTx/>
-                <a:uFillTx/>
-                <a:latin typeface="Calibri" pitchFamily="34" charset="0"/>
-              </a:rPr>
-              <a:t> 1</a:t>
-            </a:r>
-            <a:endParaRPr kumimoji="0" lang="en-US" sz="1800" b="0" i="0" u="none" strike="noStrike" kern="0" cap="none" spc="0" normalizeH="0" baseline="0" noProof="0" dirty="0">
-              <a:ln>
-                <a:noFill/>
-              </a:ln>
-              <a:solidFill>
-                <a:sysClr val="windowText" lastClr="000000"/>
-              </a:solidFill>
-              <a:effectLst/>
-              <a:uLnTx/>
-              <a:uFillTx/>
-              <a:latin typeface="Calibri" pitchFamily="34" charset="0"/>
-            </a:endParaRPr>
-          </a:p>
-        </p:txBody>
-      </p:sp>
-      <p:sp>
-        <p:nvSpPr>
-          <p:cNvPr id="259" name="TextBox 258"/>
-          <p:cNvSpPr txBox="1"/>
-          <p:nvPr/>
-        </p:nvSpPr>
-        <p:spPr>
-          <a:xfrm>
-            <a:off x="2057400" y="2940908"/>
-            <a:ext cx="381000" cy="381000"/>
-          </a:xfrm>
-          <a:prstGeom prst="rect">
-            <a:avLst/>
-          </a:prstGeom>
-          <a:noFill/>
-        </p:spPr>
-        <p:txBody>
-          <a:bodyPr wrap="square" rtlCol="0">
-            <a:spAutoFit/>
-          </a:bodyPr>
-          <a:lstStyle/>
-          <a:p>
-            <a:pPr marL="0" marR="0" lvl="0" indent="0" defTabSz="914400" eaLnBrk="1" fontAlgn="auto" latinLnBrk="0" hangingPunct="1">
-              <a:lnSpc>
-                <a:spcPct val="100000"/>
-              </a:lnSpc>
-              <a:spcBef>
-                <a:spcPts val="0"/>
-              </a:spcBef>
-              <a:spcAft>
-                <a:spcPts val="0"/>
-              </a:spcAft>
-              <a:buClrTx/>
-              <a:buSzTx/>
-              <a:buFontTx/>
-              <a:buNone/>
-              <a:tabLst/>
-              <a:defRPr/>
-            </a:pPr>
-            <a:r>
-              <a:rPr kumimoji="0" lang="en-US" sz="1800" b="0" i="0" u="none" strike="noStrike" kern="0" cap="none" spc="0" normalizeH="0" baseline="0" noProof="0" dirty="0" smtClean="0">
-                <a:ln>
-                  <a:noFill/>
-                </a:ln>
-                <a:solidFill>
-                  <a:sysClr val="windowText" lastClr="000000"/>
-                </a:solidFill>
-                <a:effectLst/>
-                <a:uLnTx/>
-                <a:uFillTx/>
-                <a:latin typeface="Calibri" pitchFamily="34" charset="0"/>
-              </a:rPr>
-              <a:t> 1</a:t>
-            </a:r>
-            <a:endParaRPr kumimoji="0" lang="en-US" sz="1800" b="0" i="0" u="none" strike="noStrike" kern="0" cap="none" spc="0" normalizeH="0" baseline="0" noProof="0" dirty="0">
-              <a:ln>
-                <a:noFill/>
-              </a:ln>
-              <a:solidFill>
-                <a:sysClr val="windowText" lastClr="000000"/>
-              </a:solidFill>
-              <a:effectLst/>
-              <a:uLnTx/>
-              <a:uFillTx/>
-              <a:latin typeface="Calibri" pitchFamily="34" charset="0"/>
-            </a:endParaRPr>
-          </a:p>
-        </p:txBody>
-      </p:sp>
-      <p:cxnSp>
-        <p:nvCxnSpPr>
-          <p:cNvPr id="260" name="Straight Connector 259"/>
-          <p:cNvCxnSpPr/>
-          <p:nvPr/>
-        </p:nvCxnSpPr>
-        <p:spPr>
-          <a:xfrm flipV="1">
-            <a:off x="2057400" y="3779108"/>
-            <a:ext cx="609600" cy="533400"/>
-          </a:xfrm>
-          <a:prstGeom prst="line">
-            <a:avLst/>
-          </a:prstGeom>
-          <a:ln w="19050">
-            <a:solidFill>
-              <a:schemeClr val="tx1"/>
-            </a:solidFill>
-            <a:prstDash val="dash"/>
-          </a:ln>
-        </p:spPr>
-        <p:style>
-          <a:lnRef idx="1">
-            <a:schemeClr val="accent1"/>
-          </a:lnRef>
-          <a:fillRef idx="0">
-            <a:schemeClr val="accent1"/>
-          </a:fillRef>
-          <a:effectRef idx="0">
-            <a:schemeClr val="accent1"/>
-          </a:effectRef>
-          <a:fontRef idx="minor">
-            <a:schemeClr val="tx1"/>
-          </a:fontRef>
-        </p:style>
-      </p:cxnSp>
-      <p:sp>
-        <p:nvSpPr>
-          <p:cNvPr id="261" name="Folded Corner 260"/>
-          <p:cNvSpPr/>
-          <p:nvPr/>
-        </p:nvSpPr>
-        <p:spPr>
-          <a:xfrm>
-            <a:off x="533400" y="4312508"/>
-            <a:ext cx="2286000" cy="771346"/>
-          </a:xfrm>
-          <a:prstGeom prst="foldedCorner">
-            <a:avLst/>
-          </a:prstGeom>
-          <a:noFill/>
-          <a:ln w="19050">
-            <a:solidFill>
-              <a:schemeClr val="tx1"/>
-            </a:solidFill>
-            <a:prstDash val="solid"/>
-            <a:headEnd type="none" w="med" len="med"/>
-            <a:tailEnd type="none" w="med" len="med"/>
-          </a:ln>
-        </p:spPr>
-        <p:style>
-          <a:lnRef idx="2">
-            <a:schemeClr val="accent1">
-              <a:shade val="50000"/>
-            </a:schemeClr>
-          </a:lnRef>
-          <a:fillRef idx="1">
-            <a:schemeClr val="accent1"/>
-          </a:fillRef>
-          <a:effectRef idx="0">
-            <a:schemeClr val="accent1"/>
-          </a:effectRef>
-          <a:fontRef idx="minor">
-            <a:schemeClr val="lt1"/>
-          </a:fontRef>
-        </p:style>
-        <p:txBody>
-          <a:bodyPr wrap="square" rtlCol="0" anchor="ctr">
-            <a:spAutoFit/>
-          </a:bodyPr>
-          <a:lstStyle/>
-          <a:p>
-            <a:pPr algn="ctr"/>
-            <a:r>
-              <a:rPr lang="en-US" b="1" dirty="0" smtClean="0">
-                <a:solidFill>
-                  <a:schemeClr val="tx1"/>
-                </a:solidFill>
-              </a:rPr>
-              <a:t>{</a:t>
-            </a:r>
-            <a:r>
-              <a:rPr lang="en-US" b="1" dirty="0" err="1" smtClean="0">
-                <a:solidFill>
-                  <a:schemeClr val="tx1"/>
-                </a:solidFill>
-              </a:rPr>
-              <a:t>FaceValue</a:t>
-            </a:r>
-            <a:r>
-              <a:rPr lang="en-US" b="1" dirty="0" smtClean="0">
-                <a:solidFill>
-                  <a:schemeClr val="tx1"/>
-                </a:solidFill>
-              </a:rPr>
-              <a:t> can be 1,2,3,4,5 or 6 only}</a:t>
-            </a:r>
-          </a:p>
-        </p:txBody>
-      </p:sp>
-      <p:sp>
-        <p:nvSpPr>
-          <p:cNvPr id="262" name="Rectangle 261"/>
-          <p:cNvSpPr/>
-          <p:nvPr/>
-        </p:nvSpPr>
-        <p:spPr>
-          <a:xfrm>
-            <a:off x="4495800" y="1961976"/>
-            <a:ext cx="1143000" cy="369332"/>
-          </a:xfrm>
-          <a:prstGeom prst="rect">
-            <a:avLst/>
-          </a:prstGeom>
-          <a:solidFill>
-            <a:srgbClr val="8064A2">
-              <a:tint val="50000"/>
-              <a:satMod val="300000"/>
-            </a:srgbClr>
-          </a:solidFill>
-          <a:ln w="9525" cap="flat" cmpd="sng" algn="ctr">
-            <a:solidFill>
-              <a:schemeClr val="tx1"/>
-            </a:solidFill>
-            <a:prstDash val="solid"/>
-          </a:ln>
-          <a:effectLst>
-            <a:outerShdw blurRad="40000" dist="20000" dir="5400000" rotWithShape="0">
-              <a:srgbClr val="000000">
-                <a:alpha val="38000"/>
-              </a:srgbClr>
-            </a:outerShdw>
-          </a:effectLst>
-        </p:spPr>
-        <p:txBody>
-          <a:bodyPr wrap="square" rtlCol="0" anchor="ctr">
-            <a:spAutoFit/>
-          </a:bodyPr>
-          <a:lstStyle/>
-          <a:p>
-            <a:pPr marL="0" marR="0" lvl="0" indent="0" algn="ctr" defTabSz="914400" eaLnBrk="1" fontAlgn="auto" latinLnBrk="0" hangingPunct="1">
-              <a:lnSpc>
-                <a:spcPct val="100000"/>
-              </a:lnSpc>
-              <a:spcBef>
-                <a:spcPts val="0"/>
-              </a:spcBef>
-              <a:spcAft>
-                <a:spcPts val="0"/>
-              </a:spcAft>
-              <a:buClrTx/>
-              <a:buSzTx/>
-              <a:buFontTx/>
-              <a:buNone/>
-              <a:tabLst/>
-              <a:defRPr/>
-            </a:pPr>
-            <a:r>
-              <a:rPr kumimoji="0" lang="en-US" sz="1800" b="0" i="0" u="none" strike="noStrike" kern="0" cap="none" spc="0" normalizeH="0" baseline="0" noProof="0" dirty="0" smtClean="0">
-                <a:ln>
-                  <a:noFill/>
-                </a:ln>
-                <a:solidFill>
-                  <a:sysClr val="windowText" lastClr="000000"/>
-                </a:solidFill>
-                <a:effectLst/>
-                <a:uLnTx/>
-                <a:uFillTx/>
-                <a:latin typeface="Calibri" pitchFamily="34" charset="0"/>
-              </a:rPr>
-              <a:t>Player</a:t>
-            </a:r>
-            <a:endParaRPr kumimoji="0" lang="en-US" sz="1800" b="0" i="0" u="none" strike="noStrike" kern="0" cap="none" spc="0" normalizeH="0" baseline="0" noProof="0" dirty="0">
-              <a:ln>
-                <a:noFill/>
-              </a:ln>
-              <a:solidFill>
-                <a:sysClr val="windowText" lastClr="000000"/>
-              </a:solidFill>
-              <a:effectLst/>
-              <a:uLnTx/>
-              <a:uFillTx/>
-              <a:latin typeface="Calibri" pitchFamily="34" charset="0"/>
-            </a:endParaRPr>
-          </a:p>
-        </p:txBody>
-      </p:sp>
-      <p:sp>
-        <p:nvSpPr>
-          <p:cNvPr id="263" name="Rectangle 262"/>
-          <p:cNvSpPr/>
-          <p:nvPr/>
-        </p:nvSpPr>
-        <p:spPr>
-          <a:xfrm>
-            <a:off x="6324600" y="3104976"/>
+            <a:off x="2133600" y="5814535"/>
             <a:ext cx="2438400" cy="369332"/>
           </a:xfrm>
           <a:prstGeom prst="rect">
@@ -4268,13 +3288,13 @@
       </p:sp>
       <p:sp>
         <p:nvSpPr>
-          <p:cNvPr id="264" name="Rectangle 263"/>
+          <p:cNvPr id="33" name="Rectangle 32"/>
           <p:cNvSpPr/>
           <p:nvPr/>
         </p:nvSpPr>
         <p:spPr>
           <a:xfrm>
-            <a:off x="7010400" y="1961976"/>
+            <a:off x="2819400" y="4671535"/>
             <a:ext cx="1143000" cy="369332"/>
           </a:xfrm>
           <a:prstGeom prst="rect">
@@ -4355,16 +3375,16 @@
       </p:sp>
       <p:cxnSp>
         <p:nvCxnSpPr>
-          <p:cNvPr id="265" name="Elbow Connector 264"/>
+          <p:cNvPr id="34" name="Elbow Connector 33"/>
           <p:cNvCxnSpPr>
-            <a:stCxn id="262" idx="3"/>
-            <a:endCxn id="264" idx="1"/>
+            <a:stCxn id="31" idx="3"/>
+            <a:endCxn id="33" idx="1"/>
           </p:cNvCxnSpPr>
           <p:nvPr/>
         </p:nvCxnSpPr>
         <p:spPr>
           <a:xfrm>
-            <a:off x="5638800" y="2146642"/>
+            <a:off x="1447800" y="4856201"/>
             <a:ext cx="1371600" cy="1588"/>
           </a:xfrm>
           <a:prstGeom prst="bentConnector3">
@@ -4384,16 +3404,16 @@
       </p:cxnSp>
       <p:cxnSp>
         <p:nvCxnSpPr>
-          <p:cNvPr id="266" name="Elbow Connector 265"/>
+          <p:cNvPr id="35" name="Elbow Connector 34"/>
           <p:cNvCxnSpPr>
-            <a:stCxn id="263" idx="0"/>
-            <a:endCxn id="264" idx="2"/>
+            <a:stCxn id="32" idx="0"/>
+            <a:endCxn id="33" idx="2"/>
           </p:cNvCxnSpPr>
           <p:nvPr/>
         </p:nvCxnSpPr>
         <p:spPr>
           <a:xfrm rot="5400000" flipH="1" flipV="1">
-            <a:off x="7176016" y="2699092"/>
+            <a:off x="2985016" y="5408651"/>
             <a:ext cx="773668" cy="38100"/>
           </a:xfrm>
           <a:prstGeom prst="bentConnector3">
@@ -4413,13 +3433,13 @@
       </p:cxnSp>
       <p:sp>
         <p:nvSpPr>
-          <p:cNvPr id="267" name="Rectangle 266"/>
+          <p:cNvPr id="36" name="Rectangle 35"/>
           <p:cNvSpPr/>
           <p:nvPr/>
         </p:nvSpPr>
         <p:spPr>
           <a:xfrm>
-            <a:off x="6324600" y="3474309"/>
+            <a:off x="2133600" y="6183868"/>
             <a:ext cx="2438400" cy="369332"/>
           </a:xfrm>
           <a:prstGeom prst="rect">
@@ -4498,7 +3518,13 @@
               <a:rPr lang="en-US" b="1" kern="0" noProof="0" dirty="0" smtClean="0">
                 <a:latin typeface="Calibri" pitchFamily="34" charset="0"/>
               </a:rPr>
-              <a:t>: DIE_VALUE</a:t>
+              <a:t>: </a:t>
+            </a:r>
+            <a:r>
+              <a:rPr lang="en-US" b="1" kern="0" noProof="0" dirty="0" err="1" smtClean="0">
+                <a:latin typeface="Calibri" pitchFamily="34" charset="0"/>
+              </a:rPr>
+              <a:t>DieValue</a:t>
             </a:r>
             <a:endParaRPr kumimoji="0" lang="en-US" sz="1800" b="1" i="0" u="none" strike="noStrike" kern="0" cap="none" spc="0" normalizeH="0" baseline="0" noProof="0" dirty="0">
               <a:ln>
@@ -4514,16 +3540,16 @@
       </p:sp>
       <p:cxnSp>
         <p:nvCxnSpPr>
-          <p:cNvPr id="268" name="Elbow Connector 51"/>
+          <p:cNvPr id="37" name="Elbow Connector 51"/>
           <p:cNvCxnSpPr>
-            <a:stCxn id="262" idx="2"/>
-            <a:endCxn id="263" idx="1"/>
+            <a:stCxn id="31" idx="2"/>
+            <a:endCxn id="32" idx="1"/>
           </p:cNvCxnSpPr>
           <p:nvPr/>
         </p:nvCxnSpPr>
         <p:spPr>
           <a:xfrm rot="16200000" flipH="1">
-            <a:off x="5216783" y="2181825"/>
+            <a:off x="1025783" y="4891384"/>
             <a:ext cx="958334" cy="1257300"/>
           </a:xfrm>
           <a:prstGeom prst="bentConnector2">
@@ -4541,13 +3567,13 @@
       </p:cxnSp>
       <p:sp>
         <p:nvSpPr>
-          <p:cNvPr id="269" name="TextBox 268"/>
+          <p:cNvPr id="38" name="TextBox 37"/>
           <p:cNvSpPr txBox="1"/>
           <p:nvPr/>
         </p:nvSpPr>
         <p:spPr>
           <a:xfrm>
-            <a:off x="5715000" y="1797908"/>
+            <a:off x="1524000" y="4507467"/>
             <a:ext cx="914400" cy="369332"/>
           </a:xfrm>
           <a:prstGeom prst="rect">
@@ -4610,13 +3636,13 @@
       </p:sp>
       <p:sp>
         <p:nvSpPr>
-          <p:cNvPr id="270" name="TextBox 269"/>
+          <p:cNvPr id="39" name="TextBox 38"/>
           <p:cNvSpPr txBox="1"/>
           <p:nvPr/>
         </p:nvSpPr>
         <p:spPr>
           <a:xfrm>
-            <a:off x="5181600" y="2788508"/>
+            <a:off x="990600" y="5498067"/>
             <a:ext cx="1066800" cy="369332"/>
           </a:xfrm>
           <a:prstGeom prst="rect">
@@ -4679,13 +3705,13 @@
       </p:sp>
       <p:sp>
         <p:nvSpPr>
-          <p:cNvPr id="271" name="TextBox 270"/>
+          <p:cNvPr id="40" name="TextBox 39"/>
           <p:cNvSpPr txBox="1"/>
           <p:nvPr/>
         </p:nvSpPr>
         <p:spPr>
           <a:xfrm>
-            <a:off x="6934200" y="2712308"/>
+            <a:off x="2743200" y="5421867"/>
             <a:ext cx="609600" cy="381000"/>
           </a:xfrm>
           <a:prstGeom prst="rect">
@@ -4748,13 +3774,13 @@
       </p:sp>
       <p:sp>
         <p:nvSpPr>
-          <p:cNvPr id="272" name="TextBox 271"/>
+          <p:cNvPr id="41" name="TextBox 40"/>
           <p:cNvSpPr txBox="1"/>
           <p:nvPr/>
         </p:nvSpPr>
         <p:spPr>
           <a:xfrm>
-            <a:off x="5943600" y="3321908"/>
+            <a:off x="1752600" y="6031467"/>
             <a:ext cx="381000" cy="381000"/>
           </a:xfrm>
           <a:prstGeom prst="rect">
@@ -4817,14 +3843,14 @@
       </p:sp>
       <p:sp>
         <p:nvSpPr>
-          <p:cNvPr id="273" name="Rectangle 272"/>
+          <p:cNvPr id="42" name="Rectangle 41"/>
           <p:cNvSpPr/>
           <p:nvPr/>
         </p:nvSpPr>
         <p:spPr>
           <a:xfrm>
-            <a:off x="5257800" y="4109476"/>
-            <a:ext cx="2362200" cy="646331"/>
+            <a:off x="5257800" y="4191000"/>
+            <a:ext cx="1981200" cy="646331"/>
           </a:xfrm>
           <a:prstGeom prst="rect">
             <a:avLst/>
@@ -4905,13 +3931,13 @@
               </a:rPr>
             </a:br>
             <a:r>
-              <a:rPr lang="en-US" b="1" kern="0" dirty="0" smtClean="0">
+              <a:rPr lang="en-US" b="1" kern="0" dirty="0" err="1" smtClean="0">
                 <a:solidFill>
                   <a:sysClr val="windowText" lastClr="000000"/>
                 </a:solidFill>
                 <a:latin typeface="Calibri" pitchFamily="34" charset="0"/>
               </a:rPr>
-              <a:t>DIE_VALUE</a:t>
+              <a:t>DieValue</a:t>
             </a:r>
             <a:endParaRPr kumimoji="0" lang="en-US" sz="1800" b="1" i="0" u="none" strike="noStrike" kern="0" cap="none" spc="0" normalizeH="0" baseline="0" noProof="0" dirty="0">
               <a:ln>
@@ -4930,14 +3956,14 @@
       </p:sp>
       <p:sp>
         <p:nvSpPr>
-          <p:cNvPr id="274" name="Rectangle 273"/>
+          <p:cNvPr id="43" name="Rectangle 42"/>
           <p:cNvSpPr/>
           <p:nvPr/>
         </p:nvSpPr>
         <p:spPr>
           <a:xfrm>
-            <a:off x="5257800" y="4732977"/>
-            <a:ext cx="2362200" cy="646331"/>
+            <a:off x="5257800" y="4798292"/>
+            <a:ext cx="1981200" cy="1754326"/>
           </a:xfrm>
           <a:prstGeom prst="rect">
             <a:avLst/>
@@ -4985,7 +4011,7 @@
           </a:bodyPr>
           <a:lstStyle/>
           <a:p>
-            <a:pPr marL="0" marR="0" lvl="0" indent="0" algn="ctr" defTabSz="914400" eaLnBrk="1" fontAlgn="auto" latinLnBrk="0" hangingPunct="1">
+            <a:pPr marL="171450" marR="0" lvl="0" defTabSz="914400" eaLnBrk="1" fontAlgn="auto" latinLnBrk="0" hangingPunct="1">
               <a:lnSpc>
                 <a:spcPct val="100000"/>
               </a:lnSpc>
@@ -5009,7 +4035,147 @@
                 </a:solidFill>
                 <a:latin typeface="Calibri" pitchFamily="34" charset="0"/>
               </a:rPr>
-              <a:t>ONE, TWO, THREE, FOUR, FIVE, SIX</a:t>
+              <a:t>ONE</a:t>
+            </a:r>
+          </a:p>
+          <a:p>
+            <a:pPr marL="171450" marR="0" lvl="0" defTabSz="914400" eaLnBrk="1" fontAlgn="auto" latinLnBrk="0" hangingPunct="1">
+              <a:lnSpc>
+                <a:spcPct val="100000"/>
+              </a:lnSpc>
+              <a:spcBef>
+                <a:spcPts val="0"/>
+              </a:spcBef>
+              <a:spcAft>
+                <a:spcPts val="0"/>
+              </a:spcAft>
+              <a:buClrTx/>
+              <a:buSzTx/>
+              <a:buFontTx/>
+              <a:buNone/>
+              <a:tabLst/>
+              <a:defRPr/>
+            </a:pPr>
+            <a:r>
+              <a:rPr lang="en-US" b="1" kern="0" noProof="0" dirty="0" smtClean="0">
+                <a:solidFill>
+                  <a:sysClr val="windowText" lastClr="000000"/>
+                </a:solidFill>
+                <a:latin typeface="Calibri" pitchFamily="34" charset="0"/>
+              </a:rPr>
+              <a:t>TWO</a:t>
+            </a:r>
+          </a:p>
+          <a:p>
+            <a:pPr marL="171450" marR="0" lvl="0" defTabSz="914400" eaLnBrk="1" fontAlgn="auto" latinLnBrk="0" hangingPunct="1">
+              <a:lnSpc>
+                <a:spcPct val="100000"/>
+              </a:lnSpc>
+              <a:spcBef>
+                <a:spcPts val="0"/>
+              </a:spcBef>
+              <a:spcAft>
+                <a:spcPts val="0"/>
+              </a:spcAft>
+              <a:buClrTx/>
+              <a:buSzTx/>
+              <a:buFontTx/>
+              <a:buNone/>
+              <a:tabLst/>
+              <a:defRPr/>
+            </a:pPr>
+            <a:r>
+              <a:rPr lang="en-US" b="1" kern="0" noProof="0" dirty="0" smtClean="0">
+                <a:solidFill>
+                  <a:sysClr val="windowText" lastClr="000000"/>
+                </a:solidFill>
+                <a:latin typeface="Calibri" pitchFamily="34" charset="0"/>
+              </a:rPr>
+              <a:t>THREE</a:t>
+            </a:r>
+          </a:p>
+          <a:p>
+            <a:pPr marL="171450" marR="0" lvl="0" defTabSz="914400" eaLnBrk="1" fontAlgn="auto" latinLnBrk="0" hangingPunct="1">
+              <a:lnSpc>
+                <a:spcPct val="100000"/>
+              </a:lnSpc>
+              <a:spcBef>
+                <a:spcPts val="0"/>
+              </a:spcBef>
+              <a:spcAft>
+                <a:spcPts val="0"/>
+              </a:spcAft>
+              <a:buClrTx/>
+              <a:buSzTx/>
+              <a:buFontTx/>
+              <a:buNone/>
+              <a:tabLst/>
+              <a:defRPr/>
+            </a:pPr>
+            <a:r>
+              <a:rPr lang="en-US" b="1" kern="0" noProof="0" dirty="0" smtClean="0">
+                <a:solidFill>
+                  <a:sysClr val="windowText" lastClr="000000"/>
+                </a:solidFill>
+                <a:latin typeface="Calibri" pitchFamily="34" charset="0"/>
+              </a:rPr>
+              <a:t>FOUR</a:t>
+            </a:r>
+          </a:p>
+          <a:p>
+            <a:pPr marL="171450" marR="0" lvl="0" defTabSz="914400" eaLnBrk="1" fontAlgn="auto" latinLnBrk="0" hangingPunct="1">
+              <a:lnSpc>
+                <a:spcPct val="100000"/>
+              </a:lnSpc>
+              <a:spcBef>
+                <a:spcPts val="0"/>
+              </a:spcBef>
+              <a:spcAft>
+                <a:spcPts val="0"/>
+              </a:spcAft>
+              <a:buClrTx/>
+              <a:buSzTx/>
+              <a:buFontTx/>
+              <a:buNone/>
+              <a:tabLst/>
+              <a:defRPr/>
+            </a:pPr>
+            <a:r>
+              <a:rPr lang="en-US" b="1" kern="0" noProof="0" dirty="0" smtClean="0">
+                <a:solidFill>
+                  <a:sysClr val="windowText" lastClr="000000"/>
+                </a:solidFill>
+                <a:latin typeface="Calibri" pitchFamily="34" charset="0"/>
+              </a:rPr>
+              <a:t>FIVE</a:t>
+            </a:r>
+          </a:p>
+          <a:p>
+            <a:pPr marL="171450" marR="0" lvl="0" defTabSz="914400" eaLnBrk="1" fontAlgn="auto" latinLnBrk="0" hangingPunct="1">
+              <a:lnSpc>
+                <a:spcPct val="100000"/>
+              </a:lnSpc>
+              <a:spcBef>
+                <a:spcPts val="0"/>
+              </a:spcBef>
+              <a:spcAft>
+                <a:spcPts val="0"/>
+              </a:spcAft>
+              <a:buClrTx/>
+              <a:buSzTx/>
+              <a:buFontTx/>
+              <a:buNone/>
+              <a:tabLst/>
+              <a:defRPr/>
+            </a:pPr>
+            <a:r>
+              <a:rPr lang="en-US" b="1" kern="0" noProof="0" dirty="0" smtClean="0">
+                <a:solidFill>
+                  <a:sysClr val="windowText" lastClr="000000"/>
+                </a:solidFill>
+                <a:latin typeface="Calibri" pitchFamily="34" charset="0"/>
+              </a:rPr>
+              <a:t>SIX</a:t>
             </a:r>
             <a:endParaRPr kumimoji="0" lang="en-US" sz="1800" b="1" i="0" u="none" strike="noStrike" kern="0" cap="none" spc="0" normalizeH="0" baseline="0" noProof="0" dirty="0">
               <a:ln>
@@ -5023,45 +4189,6 @@
               <a:uFillTx/>
               <a:latin typeface="Calibri" pitchFamily="34" charset="0"/>
             </a:endParaRPr>
-          </a:p>
-        </p:txBody>
-      </p:sp>
-      <p:sp>
-        <p:nvSpPr>
-          <p:cNvPr id="275" name="Striped Right Arrow 274"/>
-          <p:cNvSpPr/>
-          <p:nvPr/>
-        </p:nvSpPr>
-        <p:spPr>
-          <a:xfrm>
-            <a:off x="4038600" y="3321908"/>
-            <a:ext cx="533400" cy="457200"/>
-          </a:xfrm>
-          <a:prstGeom prst="stripedRightArrow">
-            <a:avLst/>
-          </a:prstGeom>
-          <a:ln/>
-        </p:spPr>
-        <p:style>
-          <a:lnRef idx="1">
-            <a:schemeClr val="accent5"/>
-          </a:lnRef>
-          <a:fillRef idx="2">
-            <a:schemeClr val="accent5"/>
-          </a:fillRef>
-          <a:effectRef idx="1">
-            <a:schemeClr val="accent5"/>
-          </a:effectRef>
-          <a:fontRef idx="minor">
-            <a:schemeClr val="dk1"/>
-          </a:fontRef>
-        </p:style>
-        <p:txBody>
-          <a:bodyPr rtlCol="0" anchor="ctr"/>
-          <a:lstStyle/>
-          <a:p>
-            <a:pPr algn="ctr"/>
-            <a:endParaRPr lang="en-US"/>
           </a:p>
         </p:txBody>
       </p:sp>
@@ -5078,167 +4205,9 @@
   <p:timing>
     <p:tnLst>
       <p:par>
-        <p:cTn id="1" dur="indefinite" restart="never" nodeType="tmRoot">
-          <p:childTnLst>
-            <p:seq concurrent="1" nextAc="seek">
-              <p:cTn id="2" dur="indefinite" nodeType="mainSeq">
-                <p:childTnLst>
-                  <p:par>
-                    <p:cTn id="3" fill="hold">
-                      <p:stCondLst>
-                        <p:cond delay="indefinite"/>
-                        <p:cond evt="onBegin" delay="0">
-                          <p:tn val="2"/>
-                        </p:cond>
-                      </p:stCondLst>
-                      <p:childTnLst>
-                        <p:par>
-                          <p:cTn id="4" fill="hold">
-                            <p:stCondLst>
-                              <p:cond delay="0"/>
-                            </p:stCondLst>
-                            <p:childTnLst>
-                              <p:par>
-                                <p:cTn id="5" presetID="1" presetClass="entr" presetSubtype="0" fill="hold" grpId="0" nodeType="withEffect">
-                                  <p:stCondLst>
-                                    <p:cond delay="0"/>
-                                  </p:stCondLst>
-                                  <p:childTnLst>
-                                    <p:set>
-                                      <p:cBhvr>
-                                        <p:cTn id="6" dur="1" fill="hold">
-                                          <p:stCondLst>
-                                            <p:cond delay="0"/>
-                                          </p:stCondLst>
-                                        </p:cTn>
-                                        <p:tgtEl>
-                                          <p:spTgt spid="261"/>
-                                        </p:tgtEl>
-                                        <p:attrNameLst>
-                                          <p:attrName>style.visibility</p:attrName>
-                                        </p:attrNameLst>
-                                      </p:cBhvr>
-                                      <p:to>
-                                        <p:strVal val="visible"/>
-                                      </p:to>
-                                    </p:set>
-                                  </p:childTnLst>
-                                </p:cTn>
-                              </p:par>
-                              <p:par>
-                                <p:cTn id="7" presetID="1" presetClass="entr" presetSubtype="0" fill="hold" grpId="0" nodeType="withEffect">
-                                  <p:stCondLst>
-                                    <p:cond delay="0"/>
-                                  </p:stCondLst>
-                                  <p:childTnLst>
-                                    <p:set>
-                                      <p:cBhvr>
-                                        <p:cTn id="8" dur="1" fill="hold">
-                                          <p:stCondLst>
-                                            <p:cond delay="0"/>
-                                          </p:stCondLst>
-                                        </p:cTn>
-                                        <p:tgtEl>
-                                          <p:spTgt spid="248"/>
-                                        </p:tgtEl>
-                                        <p:attrNameLst>
-                                          <p:attrName>style.visibility</p:attrName>
-                                        </p:attrNameLst>
-                                      </p:cBhvr>
-                                      <p:to>
-                                        <p:strVal val="visible"/>
-                                      </p:to>
-                                    </p:set>
-                                  </p:childTnLst>
-                                </p:cTn>
-                              </p:par>
-                              <p:par>
-                                <p:cTn id="9" presetID="1" presetClass="entr" presetSubtype="0" fill="hold" grpId="0" nodeType="withEffect">
-                                  <p:stCondLst>
-                                    <p:cond delay="0"/>
-                                  </p:stCondLst>
-                                  <p:childTnLst>
-                                    <p:set>
-                                      <p:cBhvr>
-                                        <p:cTn id="10" dur="1" fill="hold">
-                                          <p:stCondLst>
-                                            <p:cond delay="0"/>
-                                          </p:stCondLst>
-                                        </p:cTn>
-                                        <p:tgtEl>
-                                          <p:spTgt spid="247"/>
-                                        </p:tgtEl>
-                                        <p:attrNameLst>
-                                          <p:attrName>style.visibility</p:attrName>
-                                        </p:attrNameLst>
-                                      </p:cBhvr>
-                                      <p:to>
-                                        <p:strVal val="visible"/>
-                                      </p:to>
-                                    </p:set>
-                                  </p:childTnLst>
-                                </p:cTn>
-                              </p:par>
-                              <p:par>
-                                <p:cTn id="11" presetID="1" presetClass="entr" presetSubtype="0" fill="hold" grpId="0" nodeType="withEffect">
-                                  <p:stCondLst>
-                                    <p:cond delay="0"/>
-                                  </p:stCondLst>
-                                  <p:childTnLst>
-                                    <p:set>
-                                      <p:cBhvr>
-                                        <p:cTn id="12" dur="1" fill="hold">
-                                          <p:stCondLst>
-                                            <p:cond delay="0"/>
-                                          </p:stCondLst>
-                                        </p:cTn>
-                                        <p:tgtEl>
-                                          <p:spTgt spid="275"/>
-                                        </p:tgtEl>
-                                        <p:attrNameLst>
-                                          <p:attrName>style.visibility</p:attrName>
-                                        </p:attrNameLst>
-                                      </p:cBhvr>
-                                      <p:to>
-                                        <p:strVal val="visible"/>
-                                      </p:to>
-                                    </p:set>
-                                  </p:childTnLst>
-                                </p:cTn>
-                              </p:par>
-                            </p:childTnLst>
-                          </p:cTn>
-                        </p:par>
-                      </p:childTnLst>
-                    </p:cTn>
-                  </p:par>
-                </p:childTnLst>
-              </p:cTn>
-              <p:prevCondLst>
-                <p:cond evt="onPrev" delay="0">
-                  <p:tgtEl>
-                    <p:sldTgt/>
-                  </p:tgtEl>
-                </p:cond>
-              </p:prevCondLst>
-              <p:nextCondLst>
-                <p:cond evt="onNext" delay="0">
-                  <p:tgtEl>
-                    <p:sldTgt/>
-                  </p:tgtEl>
-                </p:cond>
-              </p:nextCondLst>
-            </p:seq>
-          </p:childTnLst>
-        </p:cTn>
+        <p:cTn id="1" dur="indefinite" restart="never" nodeType="tmRoot"/>
       </p:par>
     </p:tnLst>
-    <p:bldLst>
-      <p:bldP spid="247" grpId="0" animBg="1"/>
-      <p:bldP spid="248" grpId="0" animBg="1"/>
-      <p:bldP spid="261" grpId="0" animBg="1"/>
-      <p:bldP spid="275" grpId="0" animBg="1"/>
-    </p:bldLst>
   </p:timing>
 </p:sld>
 </file>

</xml_diff>